<commit_message>
12/12/2021 => Correcao portugues no PPT
</commit_message>
<xml_diff>
--- a/Documentos/Apresentação.pptx
+++ b/Documentos/Apresentação.pptx
@@ -107,6 +107,11 @@
       </a:defRPr>
     </a:lvl9pPr>
   </p:defaultTextStyle>
+  <p:extLst>
+    <p:ext uri="{EFAFB233-063F-42B5-8137-9DF3F51BA10A}">
+      <p15:sldGuideLst xmlns:p15="http://schemas.microsoft.com/office/powerpoint/2012/main"/>
+    </p:ext>
+  </p:extLst>
 </p:presentation>
 </file>
 
@@ -241,7 +246,7 @@
           <a:p>
             <a:fld id="{241A1498-8A5A-4906-84DB-A1EBFF795977}" type="datetimeFigureOut">
               <a:rPr lang="pt-BR" smtClean="0"/>
-              <a:t>11/12/2021</a:t>
+              <a:t>12/12/2021</a:t>
             </a:fld>
             <a:endParaRPr lang="pt-BR"/>
           </a:p>
@@ -411,7 +416,7 @@
           <a:p>
             <a:fld id="{241A1498-8A5A-4906-84DB-A1EBFF795977}" type="datetimeFigureOut">
               <a:rPr lang="pt-BR" smtClean="0"/>
-              <a:t>11/12/2021</a:t>
+              <a:t>12/12/2021</a:t>
             </a:fld>
             <a:endParaRPr lang="pt-BR"/>
           </a:p>
@@ -591,7 +596,7 @@
           <a:p>
             <a:fld id="{241A1498-8A5A-4906-84DB-A1EBFF795977}" type="datetimeFigureOut">
               <a:rPr lang="pt-BR" smtClean="0"/>
-              <a:t>11/12/2021</a:t>
+              <a:t>12/12/2021</a:t>
             </a:fld>
             <a:endParaRPr lang="pt-BR"/>
           </a:p>
@@ -761,7 +766,7 @@
           <a:p>
             <a:fld id="{241A1498-8A5A-4906-84DB-A1EBFF795977}" type="datetimeFigureOut">
               <a:rPr lang="pt-BR" smtClean="0"/>
-              <a:t>11/12/2021</a:t>
+              <a:t>12/12/2021</a:t>
             </a:fld>
             <a:endParaRPr lang="pt-BR"/>
           </a:p>
@@ -1007,7 +1012,7 @@
           <a:p>
             <a:fld id="{241A1498-8A5A-4906-84DB-A1EBFF795977}" type="datetimeFigureOut">
               <a:rPr lang="pt-BR" smtClean="0"/>
-              <a:t>11/12/2021</a:t>
+              <a:t>12/12/2021</a:t>
             </a:fld>
             <a:endParaRPr lang="pt-BR"/>
           </a:p>
@@ -1239,7 +1244,7 @@
           <a:p>
             <a:fld id="{241A1498-8A5A-4906-84DB-A1EBFF795977}" type="datetimeFigureOut">
               <a:rPr lang="pt-BR" smtClean="0"/>
-              <a:t>11/12/2021</a:t>
+              <a:t>12/12/2021</a:t>
             </a:fld>
             <a:endParaRPr lang="pt-BR"/>
           </a:p>
@@ -1606,7 +1611,7 @@
           <a:p>
             <a:fld id="{241A1498-8A5A-4906-84DB-A1EBFF795977}" type="datetimeFigureOut">
               <a:rPr lang="pt-BR" smtClean="0"/>
-              <a:t>11/12/2021</a:t>
+              <a:t>12/12/2021</a:t>
             </a:fld>
             <a:endParaRPr lang="pt-BR"/>
           </a:p>
@@ -1724,7 +1729,7 @@
           <a:p>
             <a:fld id="{241A1498-8A5A-4906-84DB-A1EBFF795977}" type="datetimeFigureOut">
               <a:rPr lang="pt-BR" smtClean="0"/>
-              <a:t>11/12/2021</a:t>
+              <a:t>12/12/2021</a:t>
             </a:fld>
             <a:endParaRPr lang="pt-BR"/>
           </a:p>
@@ -1819,7 +1824,7 @@
           <a:p>
             <a:fld id="{241A1498-8A5A-4906-84DB-A1EBFF795977}" type="datetimeFigureOut">
               <a:rPr lang="pt-BR" smtClean="0"/>
-              <a:t>11/12/2021</a:t>
+              <a:t>12/12/2021</a:t>
             </a:fld>
             <a:endParaRPr lang="pt-BR"/>
           </a:p>
@@ -2096,7 +2101,7 @@
           <a:p>
             <a:fld id="{241A1498-8A5A-4906-84DB-A1EBFF795977}" type="datetimeFigureOut">
               <a:rPr lang="pt-BR" smtClean="0"/>
-              <a:t>11/12/2021</a:t>
+              <a:t>12/12/2021</a:t>
             </a:fld>
             <a:endParaRPr lang="pt-BR"/>
           </a:p>
@@ -2349,7 +2354,7 @@
           <a:p>
             <a:fld id="{241A1498-8A5A-4906-84DB-A1EBFF795977}" type="datetimeFigureOut">
               <a:rPr lang="pt-BR" smtClean="0"/>
-              <a:t>11/12/2021</a:t>
+              <a:t>12/12/2021</a:t>
             </a:fld>
             <a:endParaRPr lang="pt-BR"/>
           </a:p>
@@ -2562,7 +2567,7 @@
           <a:p>
             <a:fld id="{241A1498-8A5A-4906-84DB-A1EBFF795977}" type="datetimeFigureOut">
               <a:rPr lang="pt-BR" smtClean="0"/>
-              <a:t>11/12/2021</a:t>
+              <a:t>12/12/2021</a:t>
             </a:fld>
             <a:endParaRPr lang="pt-BR"/>
           </a:p>
@@ -3542,7 +3547,14 @@
                 <a:latin typeface="Times New Roman" panose="02020603050405020304" pitchFamily="18" charset="0"/>
                 <a:ea typeface="Times New Roman" panose="02020603050405020304" pitchFamily="18" charset="0"/>
               </a:rPr>
-              <a:t>GERAL RELATÓRIO DE TEMPO DE CARGA;</a:t>
+              <a:t>GERAR </a:t>
+            </a:r>
+            <a:r>
+              <a:rPr lang="pt-BR" sz="1600" dirty="0" smtClean="0">
+                <a:latin typeface="Times New Roman" panose="02020603050405020304" pitchFamily="18" charset="0"/>
+                <a:ea typeface="Times New Roman" panose="02020603050405020304" pitchFamily="18" charset="0"/>
+              </a:rPr>
+              <a:t>RELATÓRIO DE TEMPO DE CARGA;</a:t>
             </a:r>
           </a:p>
           <a:p>
@@ -3731,7 +3743,21 @@
                 <a:latin typeface="Times New Roman" panose="02020603050405020304" pitchFamily="18" charset="0"/>
                 <a:ea typeface="Times New Roman" panose="02020603050405020304" pitchFamily="18" charset="0"/>
               </a:rPr>
-              <a:t>POSSUIR UM INTERFACE DE FACIL USABILIDADE</a:t>
+              <a:t>POSSUIR </a:t>
+            </a:r>
+            <a:r>
+              <a:rPr lang="pt-BR" sz="1600" dirty="0" smtClean="0">
+                <a:latin typeface="Times New Roman" panose="02020603050405020304" pitchFamily="18" charset="0"/>
+                <a:ea typeface="Times New Roman" panose="02020603050405020304" pitchFamily="18" charset="0"/>
+              </a:rPr>
+              <a:t>UMA </a:t>
+            </a:r>
+            <a:r>
+              <a:rPr lang="pt-BR" sz="1600" dirty="0" smtClean="0">
+                <a:latin typeface="Times New Roman" panose="02020603050405020304" pitchFamily="18" charset="0"/>
+                <a:ea typeface="Times New Roman" panose="02020603050405020304" pitchFamily="18" charset="0"/>
+              </a:rPr>
+              <a:t>INTERFACE DE FACIL USABILIDADE</a:t>
             </a:r>
             <a:r>
               <a:rPr lang="pt-BR" sz="1600" dirty="0" smtClean="0">

</xml_diff>